<commit_message>
Adding the user flow
</commit_message>
<xml_diff>
--- a/media/media.pptx
+++ b/media/media.pptx
@@ -5,10 +5,11 @@
     <p:sldMasterId id="2147483648" r:id="rId1"/>
   </p:sldMasterIdLst>
   <p:notesMasterIdLst>
-    <p:notesMasterId r:id="rId3"/>
+    <p:notesMasterId r:id="rId4"/>
   </p:notesMasterIdLst>
   <p:sldIdLst>
     <p:sldId id="258" r:id="rId2"/>
+    <p:sldId id="259" r:id="rId3"/>
   </p:sldIdLst>
   <p:sldSz cx="12192000" cy="6858000"/>
   <p:notesSz cx="6858000" cy="9144000"/>
@@ -4719,6 +4720,351 @@
     <p:extLst>
       <p:ext uri="{BB962C8B-B14F-4D97-AF65-F5344CB8AC3E}">
         <p14:creationId xmlns:p14="http://schemas.microsoft.com/office/powerpoint/2010/main" val="1590160354"/>
+      </p:ext>
+    </p:extLst>
+  </p:cSld>
+  <p:clrMapOvr>
+    <a:masterClrMapping/>
+  </p:clrMapOvr>
+</p:sld>
+</file>
+
+<file path=ppt/slides/slide2.xml><?xml version="1.0" encoding="utf-8"?>
+<p:sld xmlns:a="http://schemas.openxmlformats.org/drawingml/2006/main" xmlns:r="http://schemas.openxmlformats.org/officeDocument/2006/relationships" xmlns:p="http://schemas.openxmlformats.org/presentationml/2006/main">
+  <p:cSld>
+    <p:spTree>
+      <p:nvGrpSpPr>
+        <p:cNvPr id="1" name=""/>
+        <p:cNvGrpSpPr/>
+        <p:nvPr/>
+      </p:nvGrpSpPr>
+      <p:grpSpPr>
+        <a:xfrm>
+          <a:off x="0" y="0"/>
+          <a:ext cx="0" cy="0"/>
+          <a:chOff x="0" y="0"/>
+          <a:chExt cx="0" cy="0"/>
+        </a:xfrm>
+      </p:grpSpPr>
+      <p:pic>
+        <p:nvPicPr>
+          <p:cNvPr id="1026" name="Picture 2">
+            <a:extLst>
+              <a:ext uri="{FF2B5EF4-FFF2-40B4-BE49-F238E27FC236}">
+                <a16:creationId xmlns:a16="http://schemas.microsoft.com/office/drawing/2014/main" id="{C1086CBA-2EA9-4242-AB6A-89C7595704C6}"/>
+              </a:ext>
+            </a:extLst>
+          </p:cNvPr>
+          <p:cNvPicPr>
+            <a:picLocks noChangeAspect="1" noChangeArrowheads="1"/>
+          </p:cNvPicPr>
+          <p:nvPr/>
+        </p:nvPicPr>
+        <p:blipFill>
+          <a:blip r:embed="rId2">
+            <a:extLst>
+              <a:ext uri="{28A0092B-C50C-407E-A947-70E740481C1C}">
+                <a14:useLocalDpi xmlns:a14="http://schemas.microsoft.com/office/drawing/2010/main" val="0"/>
+              </a:ext>
+            </a:extLst>
+          </a:blip>
+          <a:srcRect/>
+          <a:stretch>
+            <a:fillRect/>
+          </a:stretch>
+        </p:blipFill>
+        <p:spPr bwMode="auto">
+          <a:xfrm>
+            <a:off x="992789" y="561846"/>
+            <a:ext cx="4168246" cy="2802269"/>
+          </a:xfrm>
+          <a:prstGeom prst="rect">
+            <a:avLst/>
+          </a:prstGeom>
+          <a:noFill/>
+          <a:extLst>
+            <a:ext uri="{909E8E84-426E-40DD-AFC4-6F175D3DCCD1}">
+              <a14:hiddenFill xmlns:a14="http://schemas.microsoft.com/office/drawing/2010/main">
+                <a:solidFill>
+                  <a:srgbClr val="FFFFFF"/>
+                </a:solidFill>
+              </a14:hiddenFill>
+            </a:ext>
+          </a:extLst>
+        </p:spPr>
+      </p:pic>
+      <p:pic>
+        <p:nvPicPr>
+          <p:cNvPr id="4" name="Picture 3">
+            <a:extLst>
+              <a:ext uri="{FF2B5EF4-FFF2-40B4-BE49-F238E27FC236}">
+                <a16:creationId xmlns:a16="http://schemas.microsoft.com/office/drawing/2014/main" id="{95DDB7B1-652C-C445-B0E4-38BF9FD2BF61}"/>
+              </a:ext>
+            </a:extLst>
+          </p:cNvPr>
+          <p:cNvPicPr>
+            <a:picLocks noChangeAspect="1"/>
+          </p:cNvPicPr>
+          <p:nvPr/>
+        </p:nvPicPr>
+        <p:blipFill>
+          <a:blip r:embed="rId3"/>
+          <a:stretch>
+            <a:fillRect/>
+          </a:stretch>
+        </p:blipFill>
+        <p:spPr>
+          <a:xfrm>
+            <a:off x="1117235" y="1511206"/>
+            <a:ext cx="3837119" cy="541603"/>
+          </a:xfrm>
+          <a:prstGeom prst="rect">
+            <a:avLst/>
+          </a:prstGeom>
+        </p:spPr>
+      </p:pic>
+      <p:pic>
+        <p:nvPicPr>
+          <p:cNvPr id="6" name="Picture 5">
+            <a:extLst>
+              <a:ext uri="{FF2B5EF4-FFF2-40B4-BE49-F238E27FC236}">
+                <a16:creationId xmlns:a16="http://schemas.microsoft.com/office/drawing/2014/main" id="{988590CD-73CD-6045-860B-EF9C6A9C319C}"/>
+              </a:ext>
+            </a:extLst>
+          </p:cNvPr>
+          <p:cNvPicPr>
+            <a:picLocks noChangeAspect="1"/>
+          </p:cNvPicPr>
+          <p:nvPr/>
+        </p:nvPicPr>
+        <p:blipFill>
+          <a:blip r:embed="rId4"/>
+          <a:stretch>
+            <a:fillRect/>
+          </a:stretch>
+        </p:blipFill>
+        <p:spPr>
+          <a:xfrm>
+            <a:off x="7036719" y="570249"/>
+            <a:ext cx="4168246" cy="2785462"/>
+          </a:xfrm>
+          <a:prstGeom prst="rect">
+            <a:avLst/>
+          </a:prstGeom>
+          <a:ln w="3175">
+            <a:solidFill>
+              <a:schemeClr val="bg1">
+                <a:lumMod val="75000"/>
+              </a:schemeClr>
+            </a:solidFill>
+          </a:ln>
+        </p:spPr>
+      </p:pic>
+      <p:pic>
+        <p:nvPicPr>
+          <p:cNvPr id="7" name="Picture 6">
+            <a:extLst>
+              <a:ext uri="{FF2B5EF4-FFF2-40B4-BE49-F238E27FC236}">
+                <a16:creationId xmlns:a16="http://schemas.microsoft.com/office/drawing/2014/main" id="{06979DBC-77DC-AE4F-8B84-BD02ABEB28D6}"/>
+              </a:ext>
+            </a:extLst>
+          </p:cNvPr>
+          <p:cNvPicPr>
+            <a:picLocks noChangeAspect="1"/>
+          </p:cNvPicPr>
+          <p:nvPr/>
+        </p:nvPicPr>
+        <p:blipFill>
+          <a:blip r:embed="rId5"/>
+          <a:stretch>
+            <a:fillRect/>
+          </a:stretch>
+        </p:blipFill>
+        <p:spPr>
+          <a:xfrm>
+            <a:off x="7040435" y="4070048"/>
+            <a:ext cx="4160815" cy="2785462"/>
+          </a:xfrm>
+          <a:prstGeom prst="rect">
+            <a:avLst/>
+          </a:prstGeom>
+          <a:ln w="3175">
+            <a:solidFill>
+              <a:schemeClr val="bg1">
+                <a:lumMod val="75000"/>
+              </a:schemeClr>
+            </a:solidFill>
+          </a:ln>
+        </p:spPr>
+      </p:pic>
+      <p:cxnSp>
+        <p:nvCxnSpPr>
+          <p:cNvPr id="10" name="Straight Arrow Connector 9">
+            <a:extLst>
+              <a:ext uri="{FF2B5EF4-FFF2-40B4-BE49-F238E27FC236}">
+                <a16:creationId xmlns:a16="http://schemas.microsoft.com/office/drawing/2014/main" id="{C9BB3361-1D07-CA49-9044-107C1230D5B8}"/>
+              </a:ext>
+            </a:extLst>
+          </p:cNvPr>
+          <p:cNvCxnSpPr>
+            <a:stCxn id="1026" idx="3"/>
+            <a:endCxn id="6" idx="1"/>
+          </p:cNvCxnSpPr>
+          <p:nvPr/>
+        </p:nvCxnSpPr>
+        <p:spPr>
+          <a:xfrm flipV="1">
+            <a:off x="5161035" y="1962980"/>
+            <a:ext cx="1875684" cy="1"/>
+          </a:xfrm>
+          <a:prstGeom prst="straightConnector1">
+            <a:avLst/>
+          </a:prstGeom>
+          <a:ln w="57150">
+            <a:tailEnd type="triangle"/>
+          </a:ln>
+        </p:spPr>
+        <p:style>
+          <a:lnRef idx="1">
+            <a:schemeClr val="accent2"/>
+          </a:lnRef>
+          <a:fillRef idx="0">
+            <a:schemeClr val="accent2"/>
+          </a:fillRef>
+          <a:effectRef idx="0">
+            <a:schemeClr val="accent2"/>
+          </a:effectRef>
+          <a:fontRef idx="minor">
+            <a:schemeClr val="tx1"/>
+          </a:fontRef>
+        </p:style>
+      </p:cxnSp>
+      <p:cxnSp>
+        <p:nvCxnSpPr>
+          <p:cNvPr id="12" name="Straight Arrow Connector 11">
+            <a:extLst>
+              <a:ext uri="{FF2B5EF4-FFF2-40B4-BE49-F238E27FC236}">
+                <a16:creationId xmlns:a16="http://schemas.microsoft.com/office/drawing/2014/main" id="{5C8F958C-D2D8-C440-B699-6512B792AAC1}"/>
+              </a:ext>
+            </a:extLst>
+          </p:cNvPr>
+          <p:cNvCxnSpPr>
+            <a:stCxn id="6" idx="2"/>
+            <a:endCxn id="7" idx="0"/>
+          </p:cNvCxnSpPr>
+          <p:nvPr/>
+        </p:nvCxnSpPr>
+        <p:spPr>
+          <a:xfrm>
+            <a:off x="9120842" y="3355711"/>
+            <a:ext cx="1" cy="714337"/>
+          </a:xfrm>
+          <a:prstGeom prst="straightConnector1">
+            <a:avLst/>
+          </a:prstGeom>
+          <a:ln w="57150">
+            <a:tailEnd type="triangle"/>
+          </a:ln>
+        </p:spPr>
+        <p:style>
+          <a:lnRef idx="1">
+            <a:schemeClr val="accent2"/>
+          </a:lnRef>
+          <a:fillRef idx="0">
+            <a:schemeClr val="accent2"/>
+          </a:fillRef>
+          <a:effectRef idx="0">
+            <a:schemeClr val="accent2"/>
+          </a:effectRef>
+          <a:fontRef idx="minor">
+            <a:schemeClr val="tx1"/>
+          </a:fontRef>
+        </p:style>
+      </p:cxnSp>
+      <p:cxnSp>
+        <p:nvCxnSpPr>
+          <p:cNvPr id="14" name="Straight Arrow Connector 13">
+            <a:extLst>
+              <a:ext uri="{FF2B5EF4-FFF2-40B4-BE49-F238E27FC236}">
+                <a16:creationId xmlns:a16="http://schemas.microsoft.com/office/drawing/2014/main" id="{AF366241-85AE-454F-853F-4B63524786A7}"/>
+              </a:ext>
+            </a:extLst>
+          </p:cNvPr>
+          <p:cNvCxnSpPr>
+            <a:cxnSpLocks/>
+            <a:stCxn id="7" idx="1"/>
+            <a:endCxn id="15" idx="3"/>
+          </p:cNvCxnSpPr>
+          <p:nvPr/>
+        </p:nvCxnSpPr>
+        <p:spPr>
+          <a:xfrm flipH="1">
+            <a:off x="5148888" y="5462779"/>
+            <a:ext cx="1891547" cy="0"/>
+          </a:xfrm>
+          <a:prstGeom prst="straightConnector1">
+            <a:avLst/>
+          </a:prstGeom>
+          <a:ln w="57150">
+            <a:tailEnd type="triangle"/>
+          </a:ln>
+        </p:spPr>
+        <p:style>
+          <a:lnRef idx="1">
+            <a:schemeClr val="accent2"/>
+          </a:lnRef>
+          <a:fillRef idx="0">
+            <a:schemeClr val="accent2"/>
+          </a:fillRef>
+          <a:effectRef idx="0">
+            <a:schemeClr val="accent2"/>
+          </a:effectRef>
+          <a:fontRef idx="minor">
+            <a:schemeClr val="tx1"/>
+          </a:fontRef>
+        </p:style>
+      </p:cxnSp>
+      <p:pic>
+        <p:nvPicPr>
+          <p:cNvPr id="15" name="Picture 14">
+            <a:extLst>
+              <a:ext uri="{FF2B5EF4-FFF2-40B4-BE49-F238E27FC236}">
+                <a16:creationId xmlns:a16="http://schemas.microsoft.com/office/drawing/2014/main" id="{191E44E6-01B8-D34A-9848-0BFDD7AE740C}"/>
+              </a:ext>
+            </a:extLst>
+          </p:cNvPr>
+          <p:cNvPicPr>
+            <a:picLocks noChangeAspect="1"/>
+          </p:cNvPicPr>
+          <p:nvPr/>
+        </p:nvPicPr>
+        <p:blipFill>
+          <a:blip r:embed="rId6"/>
+          <a:stretch>
+            <a:fillRect/>
+          </a:stretch>
+        </p:blipFill>
+        <p:spPr>
+          <a:xfrm>
+            <a:off x="973851" y="4061977"/>
+            <a:ext cx="4175037" cy="2801604"/>
+          </a:xfrm>
+          <a:prstGeom prst="rect">
+            <a:avLst/>
+          </a:prstGeom>
+          <a:ln w="3175">
+            <a:solidFill>
+              <a:schemeClr val="bg1">
+                <a:lumMod val="75000"/>
+              </a:schemeClr>
+            </a:solidFill>
+          </a:ln>
+        </p:spPr>
+      </p:pic>
+    </p:spTree>
+    <p:extLst>
+      <p:ext uri="{BB962C8B-B14F-4D97-AF65-F5344CB8AC3E}">
+        <p14:creationId xmlns:p14="http://schemas.microsoft.com/office/powerpoint/2010/main" val="334912081"/>
       </p:ext>
     </p:extLst>
   </p:cSld>

</xml_diff>